<commit_message>
Corrected small mistake in the diagram of intervention
</commit_message>
<xml_diff>
--- a/manuscripts/diagrams/diagrams_interventions_JV_LDT_JV.pptx
+++ b/manuscripts/diagrams/diagrams_interventions_JV_LDT_JV.pptx
@@ -258,7 +258,7 @@
           <a:p>
             <a:fld id="{846CE7D5-CF57-46EF-B807-FDD0502418D4}" type="datetimeFigureOut">
               <a:rPr lang="en-GB" smtClean="0"/>
-              <a:t>23/08/2020</a:t>
+              <a:t>24/08/2020</a:t>
             </a:fld>
             <a:endParaRPr lang="en-GB"/>
           </a:p>
@@ -428,7 +428,7 @@
           <a:p>
             <a:fld id="{846CE7D5-CF57-46EF-B807-FDD0502418D4}" type="datetimeFigureOut">
               <a:rPr lang="en-GB" smtClean="0"/>
-              <a:t>23/08/2020</a:t>
+              <a:t>24/08/2020</a:t>
             </a:fld>
             <a:endParaRPr lang="en-GB"/>
           </a:p>
@@ -608,7 +608,7 @@
           <a:p>
             <a:fld id="{846CE7D5-CF57-46EF-B807-FDD0502418D4}" type="datetimeFigureOut">
               <a:rPr lang="en-GB" smtClean="0"/>
-              <a:t>23/08/2020</a:t>
+              <a:t>24/08/2020</a:t>
             </a:fld>
             <a:endParaRPr lang="en-GB"/>
           </a:p>
@@ -778,7 +778,7 @@
           <a:p>
             <a:fld id="{846CE7D5-CF57-46EF-B807-FDD0502418D4}" type="datetimeFigureOut">
               <a:rPr lang="en-GB" smtClean="0"/>
-              <a:t>23/08/2020</a:t>
+              <a:t>24/08/2020</a:t>
             </a:fld>
             <a:endParaRPr lang="en-GB"/>
           </a:p>
@@ -1024,7 +1024,7 @@
           <a:p>
             <a:fld id="{846CE7D5-CF57-46EF-B807-FDD0502418D4}" type="datetimeFigureOut">
               <a:rPr lang="en-GB" smtClean="0"/>
-              <a:t>23/08/2020</a:t>
+              <a:t>24/08/2020</a:t>
             </a:fld>
             <a:endParaRPr lang="en-GB"/>
           </a:p>
@@ -1256,7 +1256,7 @@
           <a:p>
             <a:fld id="{846CE7D5-CF57-46EF-B807-FDD0502418D4}" type="datetimeFigureOut">
               <a:rPr lang="en-GB" smtClean="0"/>
-              <a:t>23/08/2020</a:t>
+              <a:t>24/08/2020</a:t>
             </a:fld>
             <a:endParaRPr lang="en-GB"/>
           </a:p>
@@ -1623,7 +1623,7 @@
           <a:p>
             <a:fld id="{846CE7D5-CF57-46EF-B807-FDD0502418D4}" type="datetimeFigureOut">
               <a:rPr lang="en-GB" smtClean="0"/>
-              <a:t>23/08/2020</a:t>
+              <a:t>24/08/2020</a:t>
             </a:fld>
             <a:endParaRPr lang="en-GB"/>
           </a:p>
@@ -1741,7 +1741,7 @@
           <a:p>
             <a:fld id="{846CE7D5-CF57-46EF-B807-FDD0502418D4}" type="datetimeFigureOut">
               <a:rPr lang="en-GB" smtClean="0"/>
-              <a:t>23/08/2020</a:t>
+              <a:t>24/08/2020</a:t>
             </a:fld>
             <a:endParaRPr lang="en-GB"/>
           </a:p>
@@ -1836,7 +1836,7 @@
           <a:p>
             <a:fld id="{846CE7D5-CF57-46EF-B807-FDD0502418D4}" type="datetimeFigureOut">
               <a:rPr lang="en-GB" smtClean="0"/>
-              <a:t>23/08/2020</a:t>
+              <a:t>24/08/2020</a:t>
             </a:fld>
             <a:endParaRPr lang="en-GB"/>
           </a:p>
@@ -2113,7 +2113,7 @@
           <a:p>
             <a:fld id="{846CE7D5-CF57-46EF-B807-FDD0502418D4}" type="datetimeFigureOut">
               <a:rPr lang="en-GB" smtClean="0"/>
-              <a:t>23/08/2020</a:t>
+              <a:t>24/08/2020</a:t>
             </a:fld>
             <a:endParaRPr lang="en-GB"/>
           </a:p>
@@ -2370,7 +2370,7 @@
           <a:p>
             <a:fld id="{846CE7D5-CF57-46EF-B807-FDD0502418D4}" type="datetimeFigureOut">
               <a:rPr lang="en-GB" smtClean="0"/>
-              <a:t>23/08/2020</a:t>
+              <a:t>24/08/2020</a:t>
             </a:fld>
             <a:endParaRPr lang="en-GB"/>
           </a:p>
@@ -2583,7 +2583,7 @@
           <a:p>
             <a:fld id="{846CE7D5-CF57-46EF-B807-FDD0502418D4}" type="datetimeFigureOut">
               <a:rPr lang="en-GB" smtClean="0"/>
-              <a:t>23/08/2020</a:t>
+              <a:t>24/08/2020</a:t>
             </a:fld>
             <a:endParaRPr lang="en-GB"/>
           </a:p>
@@ -6675,13 +6675,13 @@
           <p:nvPr>
             <p:extLst>
               <p:ext uri="{D42A27DB-BD31-4B8C-83A1-F6EECF244321}">
-                <p14:modId xmlns:p14="http://schemas.microsoft.com/office/powerpoint/2010/main" val="3754069521"/>
+                <p14:modId xmlns:p14="http://schemas.microsoft.com/office/powerpoint/2010/main" val="1354640314"/>
               </p:ext>
             </p:extLst>
           </p:nvPr>
         </p:nvGraphicFramePr>
         <p:xfrm>
-          <a:off x="4992356" y="917421"/>
+          <a:off x="5013788" y="740049"/>
           <a:ext cx="6884618" cy="5773327"/>
         </p:xfrm>
         <a:graphic>
@@ -6696,14 +6696,14 @@
                     </a:ext>
                   </a:extLst>
                 </a:gridCol>
-                <a:gridCol w="3463892">
+                <a:gridCol w="3389220">
                   <a:extLst>
                     <a:ext uri="{9D8B030D-6E8A-4147-A177-3AD203B41FA5}">
                       <a16:colId xmlns:a16="http://schemas.microsoft.com/office/drawing/2014/main" val="20001"/>
                     </a:ext>
                   </a:extLst>
                 </a:gridCol>
-                <a:gridCol w="3108359">
+                <a:gridCol w="3183031">
                   <a:extLst>
                     <a:ext uri="{9D8B030D-6E8A-4147-A177-3AD203B41FA5}">
                       <a16:colId xmlns:a16="http://schemas.microsoft.com/office/drawing/2014/main" val="20002"/>
@@ -8115,7 +8115,7 @@
                           <a:effectLst/>
                           <a:latin typeface="Calibri"/>
                         </a:rPr>
-                        <a:t> people in the safety zone can have with people from the exposed zone (contacts always happen in the buffering zone)</a:t>
+                        <a:t> people in the safety zone can have with people from the exposed zone (contacts always happen in the buffer zone)</a:t>
                       </a:r>
                     </a:p>
                   </a:txBody>
@@ -8596,7 +8596,7 @@
                           <a:effectLst/>
                           <a:latin typeface="Calibri"/>
                         </a:rPr>
-                        <a:t>Reduces value of 3b at 50% or 90%</a:t>
+                        <a:t>Reduces value of 3b by 50% or 90%</a:t>
                       </a:r>
                     </a:p>
                   </a:txBody>
@@ -8705,7 +8705,7 @@
                       <a:tailEnd type="none" w="med" len="med"/>
                     </a:lnB>
                     <a:solidFill>
-                      <a:srgbClr val="FF0000"/>
+                      <a:srgbClr val="FF5050"/>
                     </a:solidFill>
                   </a:tcPr>
                 </a:tc>
@@ -8765,7 +8765,7 @@
                       <a:tailEnd type="none" w="med" len="med"/>
                     </a:lnB>
                     <a:solidFill>
-                      <a:srgbClr val="FF0000"/>
+                      <a:srgbClr val="FF5050"/>
                     </a:solidFill>
                   </a:tcPr>
                 </a:tc>
@@ -8825,7 +8825,7 @@
                       <a:tailEnd type="none" w="med" len="med"/>
                     </a:lnB>
                     <a:solidFill>
-                      <a:srgbClr val="FF0000"/>
+                      <a:srgbClr val="FF5050"/>
                     </a:solidFill>
                   </a:tcPr>
                 </a:tc>
@@ -9071,7 +9071,7 @@
         </p:blipFill>
         <p:spPr>
           <a:xfrm>
-            <a:off x="6739067" y="2146465"/>
+            <a:off x="6853371" y="1982155"/>
             <a:ext cx="131452" cy="177174"/>
           </a:xfrm>
           <a:prstGeom prst="rect">
@@ -13720,14 +13720,14 @@
           <p:nvPr>
             <p:extLst>
               <p:ext uri="{D42A27DB-BD31-4B8C-83A1-F6EECF244321}">
-                <p14:modId xmlns:p14="http://schemas.microsoft.com/office/powerpoint/2010/main" val="341269630"/>
+                <p14:modId xmlns:p14="http://schemas.microsoft.com/office/powerpoint/2010/main" val="1434319822"/>
               </p:ext>
             </p:extLst>
           </p:nvPr>
         </p:nvGraphicFramePr>
         <p:xfrm>
           <a:off x="4743066" y="216795"/>
-          <a:ext cx="7422736" cy="6388978"/>
+          <a:ext cx="7287009" cy="6544426"/>
         </p:xfrm>
         <a:graphic>
           <a:graphicData uri="http://schemas.openxmlformats.org/drawingml/2006/table">
@@ -13736,14 +13736,14 @@
                 <a:tableStyleId>{F2DE63D5-997A-4646-A377-4702673A728D}</a:tableStyleId>
               </a:tblPr>
               <a:tblGrid>
-                <a:gridCol w="4289067">
+                <a:gridCol w="4186622">
                   <a:extLst>
                     <a:ext uri="{9D8B030D-6E8A-4147-A177-3AD203B41FA5}">
                       <a16:colId xmlns:a16="http://schemas.microsoft.com/office/drawing/2014/main" val="458690852"/>
                     </a:ext>
                   </a:extLst>
                 </a:gridCol>
-                <a:gridCol w="3133669">
+                <a:gridCol w="3100387">
                   <a:extLst>
                     <a:ext uri="{9D8B030D-6E8A-4147-A177-3AD203B41FA5}">
                       <a16:colId xmlns:a16="http://schemas.microsoft.com/office/drawing/2014/main" val="2586380066"/>
@@ -13932,6 +13932,9 @@
                       <a:headEnd type="none" w="med" len="med"/>
                       <a:tailEnd type="none" w="med" len="med"/>
                     </a:lnB>
+                    <a:solidFill>
+                      <a:srgbClr val="ED7D31"/>
+                    </a:solidFill>
                   </a:tcPr>
                 </a:tc>
                 <a:tc>
@@ -13980,6 +13983,9 @@
                       <a:headEnd type="none" w="med" len="med"/>
                       <a:tailEnd type="none" w="med" len="med"/>
                     </a:lnB>
+                    <a:solidFill>
+                      <a:srgbClr val="ED7D31"/>
+                    </a:solidFill>
                   </a:tcPr>
                 </a:tc>
                 <a:extLst>
@@ -14060,6 +14066,9 @@
                       <a:headEnd type="none" w="med" len="med"/>
                       <a:tailEnd type="none" w="med" len="med"/>
                     </a:lnB>
+                    <a:solidFill>
+                      <a:srgbClr val="FFCC99"/>
+                    </a:solidFill>
                   </a:tcPr>
                 </a:tc>
                 <a:tc>
@@ -14108,6 +14117,9 @@
                       <a:headEnd type="none" w="med" len="med"/>
                       <a:tailEnd type="none" w="med" len="med"/>
                     </a:lnB>
+                    <a:solidFill>
+                      <a:srgbClr val="FFCC99"/>
+                    </a:solidFill>
                   </a:tcPr>
                 </a:tc>
                 <a:extLst>
@@ -14176,6 +14188,9 @@
                       <a:headEnd type="none" w="med" len="med"/>
                       <a:tailEnd type="none" w="med" len="med"/>
                     </a:lnB>
+                    <a:solidFill>
+                      <a:srgbClr val="FFCC99"/>
+                    </a:solidFill>
                   </a:tcPr>
                 </a:tc>
                 <a:tc>
@@ -14224,6 +14239,9 @@
                       <a:headEnd type="none" w="med" len="med"/>
                       <a:tailEnd type="none" w="med" len="med"/>
                     </a:lnB>
+                    <a:solidFill>
+                      <a:srgbClr val="FFCC99"/>
+                    </a:solidFill>
                   </a:tcPr>
                 </a:tc>
                 <a:extLst>
@@ -14279,6 +14297,9 @@
                       <a:headEnd type="none" w="med" len="med"/>
                       <a:tailEnd type="none" w="med" len="med"/>
                     </a:lnB>
+                    <a:solidFill>
+                      <a:srgbClr val="FFCC99"/>
+                    </a:solidFill>
                   </a:tcPr>
                 </a:tc>
                 <a:tc>
@@ -14327,6 +14348,9 @@
                       <a:headEnd type="none" w="med" len="med"/>
                       <a:tailEnd type="none" w="med" len="med"/>
                     </a:lnB>
+                    <a:solidFill>
+                      <a:srgbClr val="FFCC99"/>
+                    </a:solidFill>
                   </a:tcPr>
                 </a:tc>
                 <a:extLst>
@@ -14396,7 +14420,7 @@
                       <a:tailEnd type="none" w="med" len="med"/>
                     </a:lnB>
                     <a:solidFill>
-                      <a:srgbClr val="8AE234"/>
+                      <a:srgbClr val="92D050"/>
                     </a:solidFill>
                   </a:tcPr>
                 </a:tc>
@@ -14419,7 +14443,7 @@
                         <a:rPr lang="en-GB" sz="1400" dirty="0">
                           <a:effectLst/>
                         </a:rPr>
-                        <a:t>Older adults + adults with comorbidities, Older adults + adults with comorbidities + healthy adults and kids, up to 20%, 25%, or 30% of the population</a:t>
+                        <a:t>Older adults + adults with comorbidities, Older adults + adults with comorbidities + healthy adults and kids (up to 20%, 25%, or 30% of the population)</a:t>
                       </a:r>
                       <a:endParaRPr lang="en-GB" sz="1400" dirty="0">
                         <a:effectLst/>
@@ -14456,7 +14480,7 @@
                       <a:tailEnd type="none" w="med" len="med"/>
                     </a:lnB>
                     <a:solidFill>
-                      <a:srgbClr val="8AE234"/>
+                      <a:srgbClr val="92D050"/>
                     </a:solidFill>
                   </a:tcPr>
                 </a:tc>
@@ -14525,7 +14549,7 @@
                       <a:prstDash val="solid"/>
                     </a:lnBlToTr>
                     <a:solidFill>
-                      <a:srgbClr val="8AE234"/>
+                      <a:srgbClr val="92D050"/>
                     </a:solidFill>
                   </a:tcPr>
                 </a:tc>
@@ -14587,7 +14611,7 @@
                       <a:prstDash val="solid"/>
                     </a:lnBlToTr>
                     <a:solidFill>
-                      <a:srgbClr val="8AE234"/>
+                      <a:srgbClr val="92D050"/>
                     </a:solidFill>
                   </a:tcPr>
                 </a:tc>
@@ -14660,7 +14684,7 @@
                       <a:prstDash val="solid"/>
                     </a:lnBlToTr>
                     <a:solidFill>
-                      <a:srgbClr val="8AE234"/>
+                      <a:srgbClr val="92D050"/>
                     </a:solidFill>
                   </a:tcPr>
                 </a:tc>
@@ -14735,7 +14759,7 @@
                       <a:prstDash val="solid"/>
                     </a:lnBlToTr>
                     <a:solidFill>
-                      <a:srgbClr val="8AE234"/>
+                      <a:srgbClr val="92D050"/>
                     </a:solidFill>
                   </a:tcPr>
                 </a:tc>
@@ -14793,7 +14817,7 @@
                       <a:tailEnd type="none" w="med" len="med"/>
                     </a:lnB>
                     <a:solidFill>
-                      <a:srgbClr val="8AE234"/>
+                      <a:srgbClr val="92D050"/>
                     </a:solidFill>
                   </a:tcPr>
                 </a:tc>
@@ -14807,7 +14831,7 @@
                         <a:rPr lang="en-GB" sz="1400" dirty="0">
                           <a:effectLst/>
                         </a:rPr>
-                        <a:t>Reduces value of 3b by 50%, or 90%</a:t>
+                        <a:t>Reduces value of 3a by 50%, or 90%</a:t>
                       </a:r>
                       <a:endParaRPr lang="en-GB" sz="1400" dirty="0">
                         <a:effectLst/>
@@ -14844,7 +14868,7 @@
                       <a:tailEnd type="none" w="med" len="med"/>
                     </a:lnB>
                     <a:solidFill>
-                      <a:srgbClr val="8AE234"/>
+                      <a:srgbClr val="92D050"/>
                     </a:solidFill>
                   </a:tcPr>
                 </a:tc>
@@ -14901,6 +14925,11 @@
                       <a:headEnd type="none" w="med" len="med"/>
                       <a:tailEnd type="none" w="med" len="med"/>
                     </a:lnB>
+                    <a:solidFill>
+                      <a:schemeClr val="accent2">
+                        <a:lumMod val="75000"/>
+                      </a:schemeClr>
+                    </a:solidFill>
                   </a:tcPr>
                 </a:tc>
                 <a:tc>
@@ -14946,6 +14975,11 @@
                       <a:headEnd type="none" w="med" len="med"/>
                       <a:tailEnd type="none" w="med" len="med"/>
                     </a:lnB>
+                    <a:solidFill>
+                      <a:schemeClr val="accent2">
+                        <a:lumMod val="75000"/>
+                      </a:schemeClr>
+                    </a:solidFill>
                   </a:tcPr>
                 </a:tc>
                 <a:extLst>

</xml_diff>

<commit_message>
Removed white space from Fig 1
</commit_message>
<xml_diff>
--- a/manuscripts/diagrams/diagrams_interventions_JV_LDT_JV.pptx
+++ b/manuscripts/diagrams/diagrams_interventions_JV_LDT_JV.pptx
@@ -15390,761 +15390,6 @@
           <a:chExt cx="0" cy="0"/>
         </a:xfrm>
       </p:grpSpPr>
-      <p:sp>
-        <p:nvSpPr>
-          <p:cNvPr id="42" name="Oval 41">
-            <a:extLst>
-              <a:ext uri="{FF2B5EF4-FFF2-40B4-BE49-F238E27FC236}">
-                <a16:creationId xmlns:a16="http://schemas.microsoft.com/office/drawing/2014/main" id="{96D6ED01-93C1-485A-8FAC-2AC17C0E9130}"/>
-              </a:ext>
-            </a:extLst>
-          </p:cNvPr>
-          <p:cNvSpPr/>
-          <p:nvPr/>
-        </p:nvSpPr>
-        <p:spPr>
-          <a:xfrm>
-            <a:off x="4337164" y="5589857"/>
-            <a:ext cx="365760" cy="365760"/>
-          </a:xfrm>
-          <a:prstGeom prst="ellipse">
-            <a:avLst/>
-          </a:prstGeom>
-          <a:solidFill>
-            <a:srgbClr val="C6C4CD"/>
-          </a:solidFill>
-          <a:ln>
-            <a:solidFill>
-              <a:schemeClr val="accent1">
-                <a:lumMod val="20000"/>
-                <a:lumOff val="80000"/>
-              </a:schemeClr>
-            </a:solidFill>
-          </a:ln>
-        </p:spPr>
-        <p:style>
-          <a:lnRef idx="2">
-            <a:schemeClr val="accent1">
-              <a:shade val="50000"/>
-            </a:schemeClr>
-          </a:lnRef>
-          <a:fillRef idx="1">
-            <a:schemeClr val="accent1"/>
-          </a:fillRef>
-          <a:effectRef idx="0">
-            <a:schemeClr val="accent1"/>
-          </a:effectRef>
-          <a:fontRef idx="minor">
-            <a:schemeClr val="lt1"/>
-          </a:fontRef>
-        </p:style>
-        <p:txBody>
-          <a:bodyPr rtlCol="0" anchor="ctr"/>
-          <a:lstStyle/>
-          <a:p>
-            <a:pPr algn="ctr"/>
-            <a:endParaRPr lang="en-US"/>
-          </a:p>
-        </p:txBody>
-      </p:sp>
-      <p:sp>
-        <p:nvSpPr>
-          <p:cNvPr id="43" name="TextBox 42">
-            <a:extLst>
-              <a:ext uri="{FF2B5EF4-FFF2-40B4-BE49-F238E27FC236}">
-                <a16:creationId xmlns:a16="http://schemas.microsoft.com/office/drawing/2014/main" id="{4C6A2750-A54A-496F-A0D5-9546714E06AF}"/>
-              </a:ext>
-            </a:extLst>
-          </p:cNvPr>
-          <p:cNvSpPr txBox="1"/>
-          <p:nvPr/>
-        </p:nvSpPr>
-        <p:spPr>
-          <a:xfrm>
-            <a:off x="4354586" y="5588071"/>
-            <a:ext cx="330916" cy="369332"/>
-          </a:xfrm>
-          <a:prstGeom prst="rect">
-            <a:avLst/>
-          </a:prstGeom>
-          <a:noFill/>
-        </p:spPr>
-        <p:txBody>
-          <a:bodyPr wrap="square" rtlCol="0">
-            <a:spAutoFit/>
-          </a:bodyPr>
-          <a:lstStyle/>
-          <a:p>
-            <a:pPr algn="ctr"/>
-            <a:r>
-              <a:rPr lang="fr-BE" dirty="0"/>
-              <a:t>4</a:t>
-            </a:r>
-            <a:endParaRPr lang="en-US" dirty="0"/>
-          </a:p>
-        </p:txBody>
-      </p:sp>
-      <p:sp>
-        <p:nvSpPr>
-          <p:cNvPr id="39" name="Oval 38">
-            <a:extLst>
-              <a:ext uri="{FF2B5EF4-FFF2-40B4-BE49-F238E27FC236}">
-                <a16:creationId xmlns:a16="http://schemas.microsoft.com/office/drawing/2014/main" id="{7C6BE17B-1F84-47E6-BC70-9C43C6C8A2EE}"/>
-              </a:ext>
-            </a:extLst>
-          </p:cNvPr>
-          <p:cNvSpPr/>
-          <p:nvPr/>
-        </p:nvSpPr>
-        <p:spPr>
-          <a:xfrm>
-            <a:off x="4337164" y="4996134"/>
-            <a:ext cx="365760" cy="365760"/>
-          </a:xfrm>
-          <a:prstGeom prst="ellipse">
-            <a:avLst/>
-          </a:prstGeom>
-          <a:solidFill>
-            <a:srgbClr val="C6C4CD"/>
-          </a:solidFill>
-          <a:ln>
-            <a:solidFill>
-              <a:schemeClr val="accent1">
-                <a:lumMod val="20000"/>
-                <a:lumOff val="80000"/>
-              </a:schemeClr>
-            </a:solidFill>
-          </a:ln>
-        </p:spPr>
-        <p:style>
-          <a:lnRef idx="2">
-            <a:schemeClr val="accent1">
-              <a:shade val="50000"/>
-            </a:schemeClr>
-          </a:lnRef>
-          <a:fillRef idx="1">
-            <a:schemeClr val="accent1"/>
-          </a:fillRef>
-          <a:effectRef idx="0">
-            <a:schemeClr val="accent1"/>
-          </a:effectRef>
-          <a:fontRef idx="minor">
-            <a:schemeClr val="lt1"/>
-          </a:fontRef>
-        </p:style>
-        <p:txBody>
-          <a:bodyPr rtlCol="0" anchor="ctr"/>
-          <a:lstStyle/>
-          <a:p>
-            <a:pPr algn="ctr"/>
-            <a:endParaRPr lang="en-US"/>
-          </a:p>
-        </p:txBody>
-      </p:sp>
-      <p:sp>
-        <p:nvSpPr>
-          <p:cNvPr id="40" name="TextBox 39">
-            <a:extLst>
-              <a:ext uri="{FF2B5EF4-FFF2-40B4-BE49-F238E27FC236}">
-                <a16:creationId xmlns:a16="http://schemas.microsoft.com/office/drawing/2014/main" id="{99472397-568E-4738-B01F-1233A24311C9}"/>
-              </a:ext>
-            </a:extLst>
-          </p:cNvPr>
-          <p:cNvSpPr txBox="1"/>
-          <p:nvPr/>
-        </p:nvSpPr>
-        <p:spPr>
-          <a:xfrm>
-            <a:off x="4291444" y="4994348"/>
-            <a:ext cx="457200" cy="369332"/>
-          </a:xfrm>
-          <a:prstGeom prst="rect">
-            <a:avLst/>
-          </a:prstGeom>
-          <a:noFill/>
-        </p:spPr>
-        <p:txBody>
-          <a:bodyPr wrap="square" rtlCol="0">
-            <a:spAutoFit/>
-          </a:bodyPr>
-          <a:lstStyle/>
-          <a:p>
-            <a:pPr algn="ctr"/>
-            <a:r>
-              <a:rPr lang="fr-BE" dirty="0"/>
-              <a:t>3c</a:t>
-            </a:r>
-            <a:endParaRPr lang="en-US" dirty="0"/>
-          </a:p>
-        </p:txBody>
-      </p:sp>
-      <p:sp>
-        <p:nvSpPr>
-          <p:cNvPr id="36" name="Oval 35">
-            <a:extLst>
-              <a:ext uri="{FF2B5EF4-FFF2-40B4-BE49-F238E27FC236}">
-                <a16:creationId xmlns:a16="http://schemas.microsoft.com/office/drawing/2014/main" id="{E75A3495-9B04-4983-9898-0D8C2C060441}"/>
-              </a:ext>
-            </a:extLst>
-          </p:cNvPr>
-          <p:cNvSpPr/>
-          <p:nvPr/>
-        </p:nvSpPr>
-        <p:spPr>
-          <a:xfrm>
-            <a:off x="4337164" y="4493470"/>
-            <a:ext cx="365760" cy="365760"/>
-          </a:xfrm>
-          <a:prstGeom prst="ellipse">
-            <a:avLst/>
-          </a:prstGeom>
-          <a:solidFill>
-            <a:srgbClr val="C6C4CD"/>
-          </a:solidFill>
-          <a:ln>
-            <a:solidFill>
-              <a:schemeClr val="accent1">
-                <a:lumMod val="20000"/>
-                <a:lumOff val="80000"/>
-              </a:schemeClr>
-            </a:solidFill>
-          </a:ln>
-        </p:spPr>
-        <p:style>
-          <a:lnRef idx="2">
-            <a:schemeClr val="accent1">
-              <a:shade val="50000"/>
-            </a:schemeClr>
-          </a:lnRef>
-          <a:fillRef idx="1">
-            <a:schemeClr val="accent1"/>
-          </a:fillRef>
-          <a:effectRef idx="0">
-            <a:schemeClr val="accent1"/>
-          </a:effectRef>
-          <a:fontRef idx="minor">
-            <a:schemeClr val="lt1"/>
-          </a:fontRef>
-        </p:style>
-        <p:txBody>
-          <a:bodyPr rtlCol="0" anchor="ctr"/>
-          <a:lstStyle/>
-          <a:p>
-            <a:pPr algn="ctr"/>
-            <a:endParaRPr lang="en-US"/>
-          </a:p>
-        </p:txBody>
-      </p:sp>
-      <p:sp>
-        <p:nvSpPr>
-          <p:cNvPr id="37" name="TextBox 36">
-            <a:extLst>
-              <a:ext uri="{FF2B5EF4-FFF2-40B4-BE49-F238E27FC236}">
-                <a16:creationId xmlns:a16="http://schemas.microsoft.com/office/drawing/2014/main" id="{82A70285-FB23-4A75-BDC5-F0B05C74925C}"/>
-              </a:ext>
-            </a:extLst>
-          </p:cNvPr>
-          <p:cNvSpPr txBox="1"/>
-          <p:nvPr/>
-        </p:nvSpPr>
-        <p:spPr>
-          <a:xfrm>
-            <a:off x="4291444" y="4491684"/>
-            <a:ext cx="457200" cy="369332"/>
-          </a:xfrm>
-          <a:prstGeom prst="rect">
-            <a:avLst/>
-          </a:prstGeom>
-          <a:noFill/>
-        </p:spPr>
-        <p:txBody>
-          <a:bodyPr wrap="square" rtlCol="0">
-            <a:spAutoFit/>
-          </a:bodyPr>
-          <a:lstStyle/>
-          <a:p>
-            <a:pPr algn="ctr"/>
-            <a:r>
-              <a:rPr lang="fr-BE" dirty="0"/>
-              <a:t>3b</a:t>
-            </a:r>
-            <a:endParaRPr lang="en-US" dirty="0"/>
-          </a:p>
-        </p:txBody>
-      </p:sp>
-      <p:sp>
-        <p:nvSpPr>
-          <p:cNvPr id="33" name="Oval 32">
-            <a:extLst>
-              <a:ext uri="{FF2B5EF4-FFF2-40B4-BE49-F238E27FC236}">
-                <a16:creationId xmlns:a16="http://schemas.microsoft.com/office/drawing/2014/main" id="{4918A201-0083-421C-AE09-38C90738DF32}"/>
-              </a:ext>
-            </a:extLst>
-          </p:cNvPr>
-          <p:cNvSpPr/>
-          <p:nvPr/>
-        </p:nvSpPr>
-        <p:spPr>
-          <a:xfrm>
-            <a:off x="4337164" y="3915816"/>
-            <a:ext cx="365760" cy="365760"/>
-          </a:xfrm>
-          <a:prstGeom prst="ellipse">
-            <a:avLst/>
-          </a:prstGeom>
-          <a:solidFill>
-            <a:srgbClr val="C6C4CD"/>
-          </a:solidFill>
-          <a:ln>
-            <a:solidFill>
-              <a:schemeClr val="accent1">
-                <a:lumMod val="20000"/>
-                <a:lumOff val="80000"/>
-              </a:schemeClr>
-            </a:solidFill>
-          </a:ln>
-        </p:spPr>
-        <p:style>
-          <a:lnRef idx="2">
-            <a:schemeClr val="accent1">
-              <a:shade val="50000"/>
-            </a:schemeClr>
-          </a:lnRef>
-          <a:fillRef idx="1">
-            <a:schemeClr val="accent1"/>
-          </a:fillRef>
-          <a:effectRef idx="0">
-            <a:schemeClr val="accent1"/>
-          </a:effectRef>
-          <a:fontRef idx="minor">
-            <a:schemeClr val="lt1"/>
-          </a:fontRef>
-        </p:style>
-        <p:txBody>
-          <a:bodyPr rtlCol="0" anchor="ctr"/>
-          <a:lstStyle/>
-          <a:p>
-            <a:pPr algn="ctr"/>
-            <a:endParaRPr lang="en-US"/>
-          </a:p>
-        </p:txBody>
-      </p:sp>
-      <p:sp>
-        <p:nvSpPr>
-          <p:cNvPr id="34" name="TextBox 33">
-            <a:extLst>
-              <a:ext uri="{FF2B5EF4-FFF2-40B4-BE49-F238E27FC236}">
-                <a16:creationId xmlns:a16="http://schemas.microsoft.com/office/drawing/2014/main" id="{C59E8250-8DE8-4BA1-A228-EE0C01FAA49A}"/>
-              </a:ext>
-            </a:extLst>
-          </p:cNvPr>
-          <p:cNvSpPr txBox="1"/>
-          <p:nvPr/>
-        </p:nvSpPr>
-        <p:spPr>
-          <a:xfrm>
-            <a:off x="4291444" y="3914030"/>
-            <a:ext cx="457200" cy="369332"/>
-          </a:xfrm>
-          <a:prstGeom prst="rect">
-            <a:avLst/>
-          </a:prstGeom>
-          <a:noFill/>
-        </p:spPr>
-        <p:txBody>
-          <a:bodyPr wrap="square" rtlCol="0">
-            <a:spAutoFit/>
-          </a:bodyPr>
-          <a:lstStyle/>
-          <a:p>
-            <a:pPr algn="ctr"/>
-            <a:r>
-              <a:rPr lang="fr-BE" dirty="0"/>
-              <a:t>3a</a:t>
-            </a:r>
-            <a:endParaRPr lang="en-US" dirty="0"/>
-          </a:p>
-        </p:txBody>
-      </p:sp>
-      <p:sp>
-        <p:nvSpPr>
-          <p:cNvPr id="27" name="Oval 26">
-            <a:extLst>
-              <a:ext uri="{FF2B5EF4-FFF2-40B4-BE49-F238E27FC236}">
-                <a16:creationId xmlns:a16="http://schemas.microsoft.com/office/drawing/2014/main" id="{93D6807F-BB47-4216-89AC-EF183237938D}"/>
-              </a:ext>
-            </a:extLst>
-          </p:cNvPr>
-          <p:cNvSpPr/>
-          <p:nvPr/>
-        </p:nvSpPr>
-        <p:spPr>
-          <a:xfrm>
-            <a:off x="4337164" y="2144168"/>
-            <a:ext cx="365760" cy="365760"/>
-          </a:xfrm>
-          <a:prstGeom prst="ellipse">
-            <a:avLst/>
-          </a:prstGeom>
-          <a:solidFill>
-            <a:srgbClr val="C6C4CD"/>
-          </a:solidFill>
-          <a:ln>
-            <a:solidFill>
-              <a:schemeClr val="accent1">
-                <a:lumMod val="20000"/>
-                <a:lumOff val="80000"/>
-              </a:schemeClr>
-            </a:solidFill>
-          </a:ln>
-        </p:spPr>
-        <p:style>
-          <a:lnRef idx="2">
-            <a:schemeClr val="accent1">
-              <a:shade val="50000"/>
-            </a:schemeClr>
-          </a:lnRef>
-          <a:fillRef idx="1">
-            <a:schemeClr val="accent1"/>
-          </a:fillRef>
-          <a:effectRef idx="0">
-            <a:schemeClr val="accent1"/>
-          </a:effectRef>
-          <a:fontRef idx="minor">
-            <a:schemeClr val="lt1"/>
-          </a:fontRef>
-        </p:style>
-        <p:txBody>
-          <a:bodyPr rtlCol="0" anchor="ctr"/>
-          <a:lstStyle/>
-          <a:p>
-            <a:pPr algn="ctr"/>
-            <a:endParaRPr lang="en-US"/>
-          </a:p>
-        </p:txBody>
-      </p:sp>
-      <p:sp>
-        <p:nvSpPr>
-          <p:cNvPr id="28" name="TextBox 27">
-            <a:extLst>
-              <a:ext uri="{FF2B5EF4-FFF2-40B4-BE49-F238E27FC236}">
-                <a16:creationId xmlns:a16="http://schemas.microsoft.com/office/drawing/2014/main" id="{990B8C87-E52C-4B71-8684-F41666E604E3}"/>
-              </a:ext>
-            </a:extLst>
-          </p:cNvPr>
-          <p:cNvSpPr txBox="1"/>
-          <p:nvPr/>
-        </p:nvSpPr>
-        <p:spPr>
-          <a:xfrm>
-            <a:off x="4291444" y="2142382"/>
-            <a:ext cx="457200" cy="369332"/>
-          </a:xfrm>
-          <a:prstGeom prst="rect">
-            <a:avLst/>
-          </a:prstGeom>
-          <a:noFill/>
-        </p:spPr>
-        <p:txBody>
-          <a:bodyPr wrap="square" rtlCol="0">
-            <a:spAutoFit/>
-          </a:bodyPr>
-          <a:lstStyle/>
-          <a:p>
-            <a:pPr algn="ctr"/>
-            <a:r>
-              <a:rPr lang="fr-BE" dirty="0"/>
-              <a:t>2b</a:t>
-            </a:r>
-            <a:endParaRPr lang="en-US" dirty="0"/>
-          </a:p>
-        </p:txBody>
-      </p:sp>
-      <p:sp>
-        <p:nvSpPr>
-          <p:cNvPr id="23" name="Oval 22">
-            <a:extLst>
-              <a:ext uri="{FF2B5EF4-FFF2-40B4-BE49-F238E27FC236}">
-                <a16:creationId xmlns:a16="http://schemas.microsoft.com/office/drawing/2014/main" id="{90625C67-A58D-445C-932D-1867BB7ACAEF}"/>
-              </a:ext>
-            </a:extLst>
-          </p:cNvPr>
-          <p:cNvSpPr/>
-          <p:nvPr/>
-        </p:nvSpPr>
-        <p:spPr>
-          <a:xfrm>
-            <a:off x="4337164" y="1657647"/>
-            <a:ext cx="365760" cy="365760"/>
-          </a:xfrm>
-          <a:prstGeom prst="ellipse">
-            <a:avLst/>
-          </a:prstGeom>
-          <a:solidFill>
-            <a:srgbClr val="C6C4CD"/>
-          </a:solidFill>
-          <a:ln>
-            <a:solidFill>
-              <a:schemeClr val="accent1">
-                <a:lumMod val="20000"/>
-                <a:lumOff val="80000"/>
-              </a:schemeClr>
-            </a:solidFill>
-          </a:ln>
-        </p:spPr>
-        <p:style>
-          <a:lnRef idx="2">
-            <a:schemeClr val="accent1">
-              <a:shade val="50000"/>
-            </a:schemeClr>
-          </a:lnRef>
-          <a:fillRef idx="1">
-            <a:schemeClr val="accent1"/>
-          </a:fillRef>
-          <a:effectRef idx="0">
-            <a:schemeClr val="accent1"/>
-          </a:effectRef>
-          <a:fontRef idx="minor">
-            <a:schemeClr val="lt1"/>
-          </a:fontRef>
-        </p:style>
-        <p:txBody>
-          <a:bodyPr rtlCol="0" anchor="ctr"/>
-          <a:lstStyle/>
-          <a:p>
-            <a:pPr algn="ctr"/>
-            <a:endParaRPr lang="en-US"/>
-          </a:p>
-        </p:txBody>
-      </p:sp>
-      <p:sp>
-        <p:nvSpPr>
-          <p:cNvPr id="24" name="TextBox 23">
-            <a:extLst>
-              <a:ext uri="{FF2B5EF4-FFF2-40B4-BE49-F238E27FC236}">
-                <a16:creationId xmlns:a16="http://schemas.microsoft.com/office/drawing/2014/main" id="{EECE5211-EC76-468F-A413-A00168CCEC56}"/>
-              </a:ext>
-            </a:extLst>
-          </p:cNvPr>
-          <p:cNvSpPr txBox="1"/>
-          <p:nvPr/>
-        </p:nvSpPr>
-        <p:spPr>
-          <a:xfrm>
-            <a:off x="4291444" y="1655861"/>
-            <a:ext cx="457200" cy="646331"/>
-          </a:xfrm>
-          <a:prstGeom prst="rect">
-            <a:avLst/>
-          </a:prstGeom>
-          <a:noFill/>
-        </p:spPr>
-        <p:txBody>
-          <a:bodyPr wrap="square" rtlCol="0">
-            <a:spAutoFit/>
-          </a:bodyPr>
-          <a:lstStyle/>
-          <a:p>
-            <a:pPr algn="ctr"/>
-            <a:r>
-              <a:rPr lang="fr-BE" dirty="0"/>
-              <a:t>2a</a:t>
-            </a:r>
-            <a:endParaRPr lang="en-US" dirty="0"/>
-          </a:p>
-        </p:txBody>
-      </p:sp>
-      <p:sp>
-        <p:nvSpPr>
-          <p:cNvPr id="20" name="Oval 19">
-            <a:extLst>
-              <a:ext uri="{FF2B5EF4-FFF2-40B4-BE49-F238E27FC236}">
-                <a16:creationId xmlns:a16="http://schemas.microsoft.com/office/drawing/2014/main" id="{2D3E1946-0673-4AD9-893E-62B5F21752E1}"/>
-              </a:ext>
-            </a:extLst>
-          </p:cNvPr>
-          <p:cNvSpPr/>
-          <p:nvPr/>
-        </p:nvSpPr>
-        <p:spPr>
-          <a:xfrm>
-            <a:off x="4337164" y="1165925"/>
-            <a:ext cx="365760" cy="365760"/>
-          </a:xfrm>
-          <a:prstGeom prst="ellipse">
-            <a:avLst/>
-          </a:prstGeom>
-          <a:solidFill>
-            <a:srgbClr val="C6C4CD"/>
-          </a:solidFill>
-          <a:ln>
-            <a:solidFill>
-              <a:schemeClr val="accent1">
-                <a:lumMod val="20000"/>
-                <a:lumOff val="80000"/>
-              </a:schemeClr>
-            </a:solidFill>
-          </a:ln>
-        </p:spPr>
-        <p:style>
-          <a:lnRef idx="2">
-            <a:schemeClr val="accent1">
-              <a:shade val="50000"/>
-            </a:schemeClr>
-          </a:lnRef>
-          <a:fillRef idx="1">
-            <a:schemeClr val="accent1"/>
-          </a:fillRef>
-          <a:effectRef idx="0">
-            <a:schemeClr val="accent1"/>
-          </a:effectRef>
-          <a:fontRef idx="minor">
-            <a:schemeClr val="lt1"/>
-          </a:fontRef>
-        </p:style>
-        <p:txBody>
-          <a:bodyPr rtlCol="0" anchor="ctr"/>
-          <a:lstStyle/>
-          <a:p>
-            <a:pPr algn="ctr"/>
-            <a:endParaRPr lang="en-US"/>
-          </a:p>
-        </p:txBody>
-      </p:sp>
-      <p:sp>
-        <p:nvSpPr>
-          <p:cNvPr id="21" name="TextBox 20">
-            <a:extLst>
-              <a:ext uri="{FF2B5EF4-FFF2-40B4-BE49-F238E27FC236}">
-                <a16:creationId xmlns:a16="http://schemas.microsoft.com/office/drawing/2014/main" id="{E574E539-3407-45F1-BF2E-F0CA15D22358}"/>
-              </a:ext>
-            </a:extLst>
-          </p:cNvPr>
-          <p:cNvSpPr txBox="1"/>
-          <p:nvPr/>
-        </p:nvSpPr>
-        <p:spPr>
-          <a:xfrm>
-            <a:off x="4354586" y="1164139"/>
-            <a:ext cx="330916" cy="369332"/>
-          </a:xfrm>
-          <a:prstGeom prst="rect">
-            <a:avLst/>
-          </a:prstGeom>
-          <a:noFill/>
-        </p:spPr>
-        <p:txBody>
-          <a:bodyPr wrap="square" rtlCol="0">
-            <a:spAutoFit/>
-          </a:bodyPr>
-          <a:lstStyle/>
-          <a:p>
-            <a:pPr algn="ctr"/>
-            <a:r>
-              <a:rPr lang="fr-BE" dirty="0"/>
-              <a:t>2</a:t>
-            </a:r>
-            <a:endParaRPr lang="en-US" dirty="0"/>
-          </a:p>
-        </p:txBody>
-      </p:sp>
-      <p:sp>
-        <p:nvSpPr>
-          <p:cNvPr id="7" name="Oval 6">
-            <a:extLst>
-              <a:ext uri="{FF2B5EF4-FFF2-40B4-BE49-F238E27FC236}">
-                <a16:creationId xmlns:a16="http://schemas.microsoft.com/office/drawing/2014/main" id="{9E3D7CAC-5186-40F4-8F56-E0E07E3B8C3C}"/>
-              </a:ext>
-            </a:extLst>
-          </p:cNvPr>
-          <p:cNvSpPr/>
-          <p:nvPr/>
-        </p:nvSpPr>
-        <p:spPr>
-          <a:xfrm>
-            <a:off x="4337164" y="685451"/>
-            <a:ext cx="365760" cy="365760"/>
-          </a:xfrm>
-          <a:prstGeom prst="ellipse">
-            <a:avLst/>
-          </a:prstGeom>
-          <a:solidFill>
-            <a:srgbClr val="C6C4CD"/>
-          </a:solidFill>
-          <a:ln>
-            <a:solidFill>
-              <a:schemeClr val="accent1">
-                <a:lumMod val="20000"/>
-                <a:lumOff val="80000"/>
-              </a:schemeClr>
-            </a:solidFill>
-          </a:ln>
-        </p:spPr>
-        <p:style>
-          <a:lnRef idx="2">
-            <a:schemeClr val="accent1">
-              <a:shade val="50000"/>
-            </a:schemeClr>
-          </a:lnRef>
-          <a:fillRef idx="1">
-            <a:schemeClr val="accent1"/>
-          </a:fillRef>
-          <a:effectRef idx="0">
-            <a:schemeClr val="accent1"/>
-          </a:effectRef>
-          <a:fontRef idx="minor">
-            <a:schemeClr val="lt1"/>
-          </a:fontRef>
-        </p:style>
-        <p:txBody>
-          <a:bodyPr rtlCol="0" anchor="ctr"/>
-          <a:lstStyle/>
-          <a:p>
-            <a:pPr algn="ctr"/>
-            <a:endParaRPr lang="en-US"/>
-          </a:p>
-        </p:txBody>
-      </p:sp>
-      <p:sp>
-        <p:nvSpPr>
-          <p:cNvPr id="10" name="TextBox 9">
-            <a:extLst>
-              <a:ext uri="{FF2B5EF4-FFF2-40B4-BE49-F238E27FC236}">
-                <a16:creationId xmlns:a16="http://schemas.microsoft.com/office/drawing/2014/main" id="{1A0EB136-5477-4706-9C86-F8AA0F35707D}"/>
-              </a:ext>
-            </a:extLst>
-          </p:cNvPr>
-          <p:cNvSpPr txBox="1"/>
-          <p:nvPr/>
-        </p:nvSpPr>
-        <p:spPr>
-          <a:xfrm>
-            <a:off x="4354586" y="683665"/>
-            <a:ext cx="330916" cy="369332"/>
-          </a:xfrm>
-          <a:prstGeom prst="rect">
-            <a:avLst/>
-          </a:prstGeom>
-          <a:noFill/>
-          <a:ln>
-            <a:noFill/>
-          </a:ln>
-        </p:spPr>
-        <p:txBody>
-          <a:bodyPr wrap="square" rtlCol="0">
-            <a:spAutoFit/>
-          </a:bodyPr>
-          <a:lstStyle/>
-          <a:p>
-            <a:pPr algn="ctr"/>
-            <a:r>
-              <a:rPr lang="fr-BE" dirty="0"/>
-              <a:t>1</a:t>
-            </a:r>
-            <a:endParaRPr lang="en-US" dirty="0"/>
-          </a:p>
-        </p:txBody>
-      </p:sp>
       <p:graphicFrame>
         <p:nvGraphicFramePr>
           <p:cNvPr id="8" name="Table 7">
@@ -16160,7 +15405,7 @@
           <p:nvPr>
             <p:extLst>
               <p:ext uri="{D42A27DB-BD31-4B8C-83A1-F6EECF244321}">
-                <p14:modId xmlns:p14="http://schemas.microsoft.com/office/powerpoint/2010/main" val="2768428079"/>
+                <p14:modId xmlns:p14="http://schemas.microsoft.com/office/powerpoint/2010/main" val="2297921130"/>
               </p:ext>
             </p:extLst>
           </p:nvPr>
@@ -17223,7 +16468,7 @@
                         <a:rPr lang="en-GB" sz="1400" dirty="0">
                           <a:effectLst/>
                         </a:rPr>
-                        <a:t>Reduces value of 3b by 50%, or 90%</a:t>
+                        <a:t>Reduces value of 3a by 50%, or 90%</a:t>
                       </a:r>
                       <a:endParaRPr lang="en-GB" sz="1400" dirty="0">
                         <a:effectLst/>
@@ -17500,41 +16745,12 @@
           </a:graphicData>
         </a:graphic>
       </p:graphicFrame>
-      <p:pic>
-        <p:nvPicPr>
-          <p:cNvPr id="5" name="Picture 4">
+      <p:grpSp>
+        <p:nvGrpSpPr>
+          <p:cNvPr id="3" name="Group 2">
             <a:extLst>
               <a:ext uri="{FF2B5EF4-FFF2-40B4-BE49-F238E27FC236}">
-                <a16:creationId xmlns:a16="http://schemas.microsoft.com/office/drawing/2014/main" id="{001AE326-1697-4AF9-BC81-4E52D194AC0D}"/>
-              </a:ext>
-            </a:extLst>
-          </p:cNvPr>
-          <p:cNvPicPr>
-            <a:picLocks noChangeAspect="1"/>
-          </p:cNvPicPr>
-          <p:nvPr/>
-        </p:nvPicPr>
-        <p:blipFill rotWithShape="1">
-          <a:blip r:embed="rId2"/>
-          <a:srcRect l="6973" t="17349" r="65312" b="6146"/>
-          <a:stretch/>
-        </p:blipFill>
-        <p:spPr>
-          <a:xfrm>
-            <a:off x="0" y="301299"/>
-            <a:ext cx="4222637" cy="6556701"/>
-          </a:xfrm>
-          <a:prstGeom prst="rect">
-            <a:avLst/>
-          </a:prstGeom>
-        </p:spPr>
-      </p:pic>
-      <p:grpSp>
-        <p:nvGrpSpPr>
-          <p:cNvPr id="2" name="Group 1">
-            <a:extLst>
-              <a:ext uri="{FF2B5EF4-FFF2-40B4-BE49-F238E27FC236}">
-                <a16:creationId xmlns:a16="http://schemas.microsoft.com/office/drawing/2014/main" id="{1CC20B3E-3E12-41A0-A2A9-EFEAE6C87C72}"/>
+                <a16:creationId xmlns:a16="http://schemas.microsoft.com/office/drawing/2014/main" id="{D045A054-A374-470C-B52E-911C28FD74CE}"/>
               </a:ext>
             </a:extLst>
           </p:cNvPr>
@@ -17543,18 +16759,18 @@
         </p:nvGrpSpPr>
         <p:grpSpPr>
           <a:xfrm>
-            <a:off x="4337164" y="2932869"/>
-            <a:ext cx="365760" cy="369332"/>
-            <a:chOff x="4337164" y="2932869"/>
-            <a:chExt cx="365760" cy="369332"/>
+            <a:off x="0" y="301299"/>
+            <a:ext cx="4748644" cy="6556701"/>
+            <a:chOff x="0" y="301299"/>
+            <a:chExt cx="4748644" cy="6556701"/>
           </a:xfrm>
         </p:grpSpPr>
         <p:sp>
           <p:nvSpPr>
-            <p:cNvPr id="30" name="Oval 29">
+            <p:cNvPr id="42" name="Oval 41">
               <a:extLst>
                 <a:ext uri="{FF2B5EF4-FFF2-40B4-BE49-F238E27FC236}">
-                  <a16:creationId xmlns:a16="http://schemas.microsoft.com/office/drawing/2014/main" id="{1BE794A7-815D-4C5A-AE06-B538ECD44BDF}"/>
+                  <a16:creationId xmlns:a16="http://schemas.microsoft.com/office/drawing/2014/main" id="{96D6ED01-93C1-485A-8FAC-2AC17C0E9130}"/>
                 </a:ext>
               </a:extLst>
             </p:cNvPr>
@@ -17563,14 +16779,14 @@
           </p:nvSpPr>
           <p:spPr>
             <a:xfrm>
-              <a:off x="4337164" y="2934655"/>
+              <a:off x="4337164" y="5589857"/>
               <a:ext cx="365760" cy="365760"/>
             </a:xfrm>
             <a:prstGeom prst="ellipse">
               <a:avLst/>
             </a:prstGeom>
             <a:solidFill>
-              <a:srgbClr val="98CDC6"/>
+              <a:srgbClr val="C6C4CD"/>
             </a:solidFill>
             <a:ln>
               <a:solidFill>
@@ -17608,10 +16824,10 @@
         </p:sp>
         <p:sp>
           <p:nvSpPr>
-            <p:cNvPr id="31" name="TextBox 30">
+            <p:cNvPr id="43" name="TextBox 42">
               <a:extLst>
                 <a:ext uri="{FF2B5EF4-FFF2-40B4-BE49-F238E27FC236}">
-                  <a16:creationId xmlns:a16="http://schemas.microsoft.com/office/drawing/2014/main" id="{EBC37B78-1CC7-4BD0-A6D4-02B44A431731}"/>
+                  <a16:creationId xmlns:a16="http://schemas.microsoft.com/office/drawing/2014/main" id="{4C6A2750-A54A-496F-A0D5-9546714E06AF}"/>
                 </a:ext>
               </a:extLst>
             </p:cNvPr>
@@ -17620,7 +16836,7 @@
           </p:nvSpPr>
           <p:spPr>
             <a:xfrm>
-              <a:off x="4354586" y="2932869"/>
+              <a:off x="4354586" y="5588071"/>
               <a:ext cx="330916" cy="369332"/>
             </a:xfrm>
             <a:prstGeom prst="rect">
@@ -17637,42 +16853,847 @@
               <a:pPr algn="ctr"/>
               <a:r>
                 <a:rPr lang="fr-BE" dirty="0"/>
-                <a:t>3</a:t>
+                <a:t>4</a:t>
               </a:r>
               <a:endParaRPr lang="en-US" dirty="0"/>
             </a:p>
           </p:txBody>
         </p:sp>
+        <p:sp>
+          <p:nvSpPr>
+            <p:cNvPr id="39" name="Oval 38">
+              <a:extLst>
+                <a:ext uri="{FF2B5EF4-FFF2-40B4-BE49-F238E27FC236}">
+                  <a16:creationId xmlns:a16="http://schemas.microsoft.com/office/drawing/2014/main" id="{7C6BE17B-1F84-47E6-BC70-9C43C6C8A2EE}"/>
+                </a:ext>
+              </a:extLst>
+            </p:cNvPr>
+            <p:cNvSpPr/>
+            <p:nvPr/>
+          </p:nvSpPr>
+          <p:spPr>
+            <a:xfrm>
+              <a:off x="4337164" y="4996134"/>
+              <a:ext cx="365760" cy="365760"/>
+            </a:xfrm>
+            <a:prstGeom prst="ellipse">
+              <a:avLst/>
+            </a:prstGeom>
+            <a:solidFill>
+              <a:srgbClr val="C6C4CD"/>
+            </a:solidFill>
+            <a:ln>
+              <a:solidFill>
+                <a:schemeClr val="accent1">
+                  <a:lumMod val="20000"/>
+                  <a:lumOff val="80000"/>
+                </a:schemeClr>
+              </a:solidFill>
+            </a:ln>
+          </p:spPr>
+          <p:style>
+            <a:lnRef idx="2">
+              <a:schemeClr val="accent1">
+                <a:shade val="50000"/>
+              </a:schemeClr>
+            </a:lnRef>
+            <a:fillRef idx="1">
+              <a:schemeClr val="accent1"/>
+            </a:fillRef>
+            <a:effectRef idx="0">
+              <a:schemeClr val="accent1"/>
+            </a:effectRef>
+            <a:fontRef idx="minor">
+              <a:schemeClr val="lt1"/>
+            </a:fontRef>
+          </p:style>
+          <p:txBody>
+            <a:bodyPr rtlCol="0" anchor="ctr"/>
+            <a:lstStyle/>
+            <a:p>
+              <a:pPr algn="ctr"/>
+              <a:endParaRPr lang="en-US"/>
+            </a:p>
+          </p:txBody>
+        </p:sp>
+        <p:sp>
+          <p:nvSpPr>
+            <p:cNvPr id="40" name="TextBox 39">
+              <a:extLst>
+                <a:ext uri="{FF2B5EF4-FFF2-40B4-BE49-F238E27FC236}">
+                  <a16:creationId xmlns:a16="http://schemas.microsoft.com/office/drawing/2014/main" id="{99472397-568E-4738-B01F-1233A24311C9}"/>
+                </a:ext>
+              </a:extLst>
+            </p:cNvPr>
+            <p:cNvSpPr txBox="1"/>
+            <p:nvPr/>
+          </p:nvSpPr>
+          <p:spPr>
+            <a:xfrm>
+              <a:off x="4291444" y="4994348"/>
+              <a:ext cx="457200" cy="369332"/>
+            </a:xfrm>
+            <a:prstGeom prst="rect">
+              <a:avLst/>
+            </a:prstGeom>
+            <a:noFill/>
+          </p:spPr>
+          <p:txBody>
+            <a:bodyPr wrap="square" rtlCol="0">
+              <a:spAutoFit/>
+            </a:bodyPr>
+            <a:lstStyle/>
+            <a:p>
+              <a:pPr algn="ctr"/>
+              <a:r>
+                <a:rPr lang="fr-BE" dirty="0"/>
+                <a:t>3c</a:t>
+              </a:r>
+              <a:endParaRPr lang="en-US" dirty="0"/>
+            </a:p>
+          </p:txBody>
+        </p:sp>
+        <p:sp>
+          <p:nvSpPr>
+            <p:cNvPr id="36" name="Oval 35">
+              <a:extLst>
+                <a:ext uri="{FF2B5EF4-FFF2-40B4-BE49-F238E27FC236}">
+                  <a16:creationId xmlns:a16="http://schemas.microsoft.com/office/drawing/2014/main" id="{E75A3495-9B04-4983-9898-0D8C2C060441}"/>
+                </a:ext>
+              </a:extLst>
+            </p:cNvPr>
+            <p:cNvSpPr/>
+            <p:nvPr/>
+          </p:nvSpPr>
+          <p:spPr>
+            <a:xfrm>
+              <a:off x="4337164" y="4493470"/>
+              <a:ext cx="365760" cy="365760"/>
+            </a:xfrm>
+            <a:prstGeom prst="ellipse">
+              <a:avLst/>
+            </a:prstGeom>
+            <a:solidFill>
+              <a:srgbClr val="C6C4CD"/>
+            </a:solidFill>
+            <a:ln>
+              <a:solidFill>
+                <a:schemeClr val="accent1">
+                  <a:lumMod val="20000"/>
+                  <a:lumOff val="80000"/>
+                </a:schemeClr>
+              </a:solidFill>
+            </a:ln>
+          </p:spPr>
+          <p:style>
+            <a:lnRef idx="2">
+              <a:schemeClr val="accent1">
+                <a:shade val="50000"/>
+              </a:schemeClr>
+            </a:lnRef>
+            <a:fillRef idx="1">
+              <a:schemeClr val="accent1"/>
+            </a:fillRef>
+            <a:effectRef idx="0">
+              <a:schemeClr val="accent1"/>
+            </a:effectRef>
+            <a:fontRef idx="minor">
+              <a:schemeClr val="lt1"/>
+            </a:fontRef>
+          </p:style>
+          <p:txBody>
+            <a:bodyPr rtlCol="0" anchor="ctr"/>
+            <a:lstStyle/>
+            <a:p>
+              <a:pPr algn="ctr"/>
+              <a:endParaRPr lang="en-US"/>
+            </a:p>
+          </p:txBody>
+        </p:sp>
+        <p:sp>
+          <p:nvSpPr>
+            <p:cNvPr id="37" name="TextBox 36">
+              <a:extLst>
+                <a:ext uri="{FF2B5EF4-FFF2-40B4-BE49-F238E27FC236}">
+                  <a16:creationId xmlns:a16="http://schemas.microsoft.com/office/drawing/2014/main" id="{82A70285-FB23-4A75-BDC5-F0B05C74925C}"/>
+                </a:ext>
+              </a:extLst>
+            </p:cNvPr>
+            <p:cNvSpPr txBox="1"/>
+            <p:nvPr/>
+          </p:nvSpPr>
+          <p:spPr>
+            <a:xfrm>
+              <a:off x="4291444" y="4491684"/>
+              <a:ext cx="457200" cy="369332"/>
+            </a:xfrm>
+            <a:prstGeom prst="rect">
+              <a:avLst/>
+            </a:prstGeom>
+            <a:noFill/>
+          </p:spPr>
+          <p:txBody>
+            <a:bodyPr wrap="square" rtlCol="0">
+              <a:spAutoFit/>
+            </a:bodyPr>
+            <a:lstStyle/>
+            <a:p>
+              <a:pPr algn="ctr"/>
+              <a:r>
+                <a:rPr lang="fr-BE" dirty="0"/>
+                <a:t>3b</a:t>
+              </a:r>
+              <a:endParaRPr lang="en-US" dirty="0"/>
+            </a:p>
+          </p:txBody>
+        </p:sp>
+        <p:sp>
+          <p:nvSpPr>
+            <p:cNvPr id="33" name="Oval 32">
+              <a:extLst>
+                <a:ext uri="{FF2B5EF4-FFF2-40B4-BE49-F238E27FC236}">
+                  <a16:creationId xmlns:a16="http://schemas.microsoft.com/office/drawing/2014/main" id="{4918A201-0083-421C-AE09-38C90738DF32}"/>
+                </a:ext>
+              </a:extLst>
+            </p:cNvPr>
+            <p:cNvSpPr/>
+            <p:nvPr/>
+          </p:nvSpPr>
+          <p:spPr>
+            <a:xfrm>
+              <a:off x="4337164" y="3915816"/>
+              <a:ext cx="365760" cy="365760"/>
+            </a:xfrm>
+            <a:prstGeom prst="ellipse">
+              <a:avLst/>
+            </a:prstGeom>
+            <a:solidFill>
+              <a:srgbClr val="C6C4CD"/>
+            </a:solidFill>
+            <a:ln>
+              <a:solidFill>
+                <a:schemeClr val="accent1">
+                  <a:lumMod val="20000"/>
+                  <a:lumOff val="80000"/>
+                </a:schemeClr>
+              </a:solidFill>
+            </a:ln>
+          </p:spPr>
+          <p:style>
+            <a:lnRef idx="2">
+              <a:schemeClr val="accent1">
+                <a:shade val="50000"/>
+              </a:schemeClr>
+            </a:lnRef>
+            <a:fillRef idx="1">
+              <a:schemeClr val="accent1"/>
+            </a:fillRef>
+            <a:effectRef idx="0">
+              <a:schemeClr val="accent1"/>
+            </a:effectRef>
+            <a:fontRef idx="minor">
+              <a:schemeClr val="lt1"/>
+            </a:fontRef>
+          </p:style>
+          <p:txBody>
+            <a:bodyPr rtlCol="0" anchor="ctr"/>
+            <a:lstStyle/>
+            <a:p>
+              <a:pPr algn="ctr"/>
+              <a:endParaRPr lang="en-US"/>
+            </a:p>
+          </p:txBody>
+        </p:sp>
+        <p:sp>
+          <p:nvSpPr>
+            <p:cNvPr id="34" name="TextBox 33">
+              <a:extLst>
+                <a:ext uri="{FF2B5EF4-FFF2-40B4-BE49-F238E27FC236}">
+                  <a16:creationId xmlns:a16="http://schemas.microsoft.com/office/drawing/2014/main" id="{C59E8250-8DE8-4BA1-A228-EE0C01FAA49A}"/>
+                </a:ext>
+              </a:extLst>
+            </p:cNvPr>
+            <p:cNvSpPr txBox="1"/>
+            <p:nvPr/>
+          </p:nvSpPr>
+          <p:spPr>
+            <a:xfrm>
+              <a:off x="4291444" y="3914030"/>
+              <a:ext cx="457200" cy="369332"/>
+            </a:xfrm>
+            <a:prstGeom prst="rect">
+              <a:avLst/>
+            </a:prstGeom>
+            <a:noFill/>
+          </p:spPr>
+          <p:txBody>
+            <a:bodyPr wrap="square" rtlCol="0">
+              <a:spAutoFit/>
+            </a:bodyPr>
+            <a:lstStyle/>
+            <a:p>
+              <a:pPr algn="ctr"/>
+              <a:r>
+                <a:rPr lang="fr-BE" dirty="0"/>
+                <a:t>3a</a:t>
+              </a:r>
+              <a:endParaRPr lang="en-US" dirty="0"/>
+            </a:p>
+          </p:txBody>
+        </p:sp>
+        <p:sp>
+          <p:nvSpPr>
+            <p:cNvPr id="27" name="Oval 26">
+              <a:extLst>
+                <a:ext uri="{FF2B5EF4-FFF2-40B4-BE49-F238E27FC236}">
+                  <a16:creationId xmlns:a16="http://schemas.microsoft.com/office/drawing/2014/main" id="{93D6807F-BB47-4216-89AC-EF183237938D}"/>
+                </a:ext>
+              </a:extLst>
+            </p:cNvPr>
+            <p:cNvSpPr/>
+            <p:nvPr/>
+          </p:nvSpPr>
+          <p:spPr>
+            <a:xfrm>
+              <a:off x="4337164" y="2144168"/>
+              <a:ext cx="365760" cy="365760"/>
+            </a:xfrm>
+            <a:prstGeom prst="ellipse">
+              <a:avLst/>
+            </a:prstGeom>
+            <a:solidFill>
+              <a:srgbClr val="C6C4CD"/>
+            </a:solidFill>
+            <a:ln>
+              <a:solidFill>
+                <a:schemeClr val="accent1">
+                  <a:lumMod val="20000"/>
+                  <a:lumOff val="80000"/>
+                </a:schemeClr>
+              </a:solidFill>
+            </a:ln>
+          </p:spPr>
+          <p:style>
+            <a:lnRef idx="2">
+              <a:schemeClr val="accent1">
+                <a:shade val="50000"/>
+              </a:schemeClr>
+            </a:lnRef>
+            <a:fillRef idx="1">
+              <a:schemeClr val="accent1"/>
+            </a:fillRef>
+            <a:effectRef idx="0">
+              <a:schemeClr val="accent1"/>
+            </a:effectRef>
+            <a:fontRef idx="minor">
+              <a:schemeClr val="lt1"/>
+            </a:fontRef>
+          </p:style>
+          <p:txBody>
+            <a:bodyPr rtlCol="0" anchor="ctr"/>
+            <a:lstStyle/>
+            <a:p>
+              <a:pPr algn="ctr"/>
+              <a:endParaRPr lang="en-US"/>
+            </a:p>
+          </p:txBody>
+        </p:sp>
+        <p:sp>
+          <p:nvSpPr>
+            <p:cNvPr id="28" name="TextBox 27">
+              <a:extLst>
+                <a:ext uri="{FF2B5EF4-FFF2-40B4-BE49-F238E27FC236}">
+                  <a16:creationId xmlns:a16="http://schemas.microsoft.com/office/drawing/2014/main" id="{990B8C87-E52C-4B71-8684-F41666E604E3}"/>
+                </a:ext>
+              </a:extLst>
+            </p:cNvPr>
+            <p:cNvSpPr txBox="1"/>
+            <p:nvPr/>
+          </p:nvSpPr>
+          <p:spPr>
+            <a:xfrm>
+              <a:off x="4291444" y="2142382"/>
+              <a:ext cx="457200" cy="369332"/>
+            </a:xfrm>
+            <a:prstGeom prst="rect">
+              <a:avLst/>
+            </a:prstGeom>
+            <a:noFill/>
+          </p:spPr>
+          <p:txBody>
+            <a:bodyPr wrap="square" rtlCol="0">
+              <a:spAutoFit/>
+            </a:bodyPr>
+            <a:lstStyle/>
+            <a:p>
+              <a:pPr algn="ctr"/>
+              <a:r>
+                <a:rPr lang="fr-BE" dirty="0"/>
+                <a:t>2b</a:t>
+              </a:r>
+              <a:endParaRPr lang="en-US" dirty="0"/>
+            </a:p>
+          </p:txBody>
+        </p:sp>
+        <p:sp>
+          <p:nvSpPr>
+            <p:cNvPr id="23" name="Oval 22">
+              <a:extLst>
+                <a:ext uri="{FF2B5EF4-FFF2-40B4-BE49-F238E27FC236}">
+                  <a16:creationId xmlns:a16="http://schemas.microsoft.com/office/drawing/2014/main" id="{90625C67-A58D-445C-932D-1867BB7ACAEF}"/>
+                </a:ext>
+              </a:extLst>
+            </p:cNvPr>
+            <p:cNvSpPr/>
+            <p:nvPr/>
+          </p:nvSpPr>
+          <p:spPr>
+            <a:xfrm>
+              <a:off x="4337164" y="1657647"/>
+              <a:ext cx="365760" cy="365760"/>
+            </a:xfrm>
+            <a:prstGeom prst="ellipse">
+              <a:avLst/>
+            </a:prstGeom>
+            <a:solidFill>
+              <a:srgbClr val="C6C4CD"/>
+            </a:solidFill>
+            <a:ln>
+              <a:solidFill>
+                <a:schemeClr val="accent1">
+                  <a:lumMod val="20000"/>
+                  <a:lumOff val="80000"/>
+                </a:schemeClr>
+              </a:solidFill>
+            </a:ln>
+          </p:spPr>
+          <p:style>
+            <a:lnRef idx="2">
+              <a:schemeClr val="accent1">
+                <a:shade val="50000"/>
+              </a:schemeClr>
+            </a:lnRef>
+            <a:fillRef idx="1">
+              <a:schemeClr val="accent1"/>
+            </a:fillRef>
+            <a:effectRef idx="0">
+              <a:schemeClr val="accent1"/>
+            </a:effectRef>
+            <a:fontRef idx="minor">
+              <a:schemeClr val="lt1"/>
+            </a:fontRef>
+          </p:style>
+          <p:txBody>
+            <a:bodyPr rtlCol="0" anchor="ctr"/>
+            <a:lstStyle/>
+            <a:p>
+              <a:pPr algn="ctr"/>
+              <a:endParaRPr lang="en-US"/>
+            </a:p>
+          </p:txBody>
+        </p:sp>
+        <p:sp>
+          <p:nvSpPr>
+            <p:cNvPr id="24" name="TextBox 23">
+              <a:extLst>
+                <a:ext uri="{FF2B5EF4-FFF2-40B4-BE49-F238E27FC236}">
+                  <a16:creationId xmlns:a16="http://schemas.microsoft.com/office/drawing/2014/main" id="{EECE5211-EC76-468F-A413-A00168CCEC56}"/>
+                </a:ext>
+              </a:extLst>
+            </p:cNvPr>
+            <p:cNvSpPr txBox="1"/>
+            <p:nvPr/>
+          </p:nvSpPr>
+          <p:spPr>
+            <a:xfrm>
+              <a:off x="4291444" y="1655861"/>
+              <a:ext cx="457200" cy="646331"/>
+            </a:xfrm>
+            <a:prstGeom prst="rect">
+              <a:avLst/>
+            </a:prstGeom>
+            <a:noFill/>
+          </p:spPr>
+          <p:txBody>
+            <a:bodyPr wrap="square" rtlCol="0">
+              <a:spAutoFit/>
+            </a:bodyPr>
+            <a:lstStyle/>
+            <a:p>
+              <a:pPr algn="ctr"/>
+              <a:r>
+                <a:rPr lang="fr-BE" dirty="0"/>
+                <a:t>2a</a:t>
+              </a:r>
+              <a:endParaRPr lang="en-US" dirty="0"/>
+            </a:p>
+          </p:txBody>
+        </p:sp>
+        <p:sp>
+          <p:nvSpPr>
+            <p:cNvPr id="20" name="Oval 19">
+              <a:extLst>
+                <a:ext uri="{FF2B5EF4-FFF2-40B4-BE49-F238E27FC236}">
+                  <a16:creationId xmlns:a16="http://schemas.microsoft.com/office/drawing/2014/main" id="{2D3E1946-0673-4AD9-893E-62B5F21752E1}"/>
+                </a:ext>
+              </a:extLst>
+            </p:cNvPr>
+            <p:cNvSpPr/>
+            <p:nvPr/>
+          </p:nvSpPr>
+          <p:spPr>
+            <a:xfrm>
+              <a:off x="4337164" y="1165925"/>
+              <a:ext cx="365760" cy="365760"/>
+            </a:xfrm>
+            <a:prstGeom prst="ellipse">
+              <a:avLst/>
+            </a:prstGeom>
+            <a:solidFill>
+              <a:srgbClr val="C6C4CD"/>
+            </a:solidFill>
+            <a:ln>
+              <a:solidFill>
+                <a:schemeClr val="accent1">
+                  <a:lumMod val="20000"/>
+                  <a:lumOff val="80000"/>
+                </a:schemeClr>
+              </a:solidFill>
+            </a:ln>
+          </p:spPr>
+          <p:style>
+            <a:lnRef idx="2">
+              <a:schemeClr val="accent1">
+                <a:shade val="50000"/>
+              </a:schemeClr>
+            </a:lnRef>
+            <a:fillRef idx="1">
+              <a:schemeClr val="accent1"/>
+            </a:fillRef>
+            <a:effectRef idx="0">
+              <a:schemeClr val="accent1"/>
+            </a:effectRef>
+            <a:fontRef idx="minor">
+              <a:schemeClr val="lt1"/>
+            </a:fontRef>
+          </p:style>
+          <p:txBody>
+            <a:bodyPr rtlCol="0" anchor="ctr"/>
+            <a:lstStyle/>
+            <a:p>
+              <a:pPr algn="ctr"/>
+              <a:endParaRPr lang="en-US"/>
+            </a:p>
+          </p:txBody>
+        </p:sp>
+        <p:sp>
+          <p:nvSpPr>
+            <p:cNvPr id="21" name="TextBox 20">
+              <a:extLst>
+                <a:ext uri="{FF2B5EF4-FFF2-40B4-BE49-F238E27FC236}">
+                  <a16:creationId xmlns:a16="http://schemas.microsoft.com/office/drawing/2014/main" id="{E574E539-3407-45F1-BF2E-F0CA15D22358}"/>
+                </a:ext>
+              </a:extLst>
+            </p:cNvPr>
+            <p:cNvSpPr txBox="1"/>
+            <p:nvPr/>
+          </p:nvSpPr>
+          <p:spPr>
+            <a:xfrm>
+              <a:off x="4354586" y="1164139"/>
+              <a:ext cx="330916" cy="369332"/>
+            </a:xfrm>
+            <a:prstGeom prst="rect">
+              <a:avLst/>
+            </a:prstGeom>
+            <a:noFill/>
+          </p:spPr>
+          <p:txBody>
+            <a:bodyPr wrap="square" rtlCol="0">
+              <a:spAutoFit/>
+            </a:bodyPr>
+            <a:lstStyle/>
+            <a:p>
+              <a:pPr algn="ctr"/>
+              <a:r>
+                <a:rPr lang="fr-BE" dirty="0"/>
+                <a:t>2</a:t>
+              </a:r>
+              <a:endParaRPr lang="en-US" dirty="0"/>
+            </a:p>
+          </p:txBody>
+        </p:sp>
+        <p:sp>
+          <p:nvSpPr>
+            <p:cNvPr id="7" name="Oval 6">
+              <a:extLst>
+                <a:ext uri="{FF2B5EF4-FFF2-40B4-BE49-F238E27FC236}">
+                  <a16:creationId xmlns:a16="http://schemas.microsoft.com/office/drawing/2014/main" id="{9E3D7CAC-5186-40F4-8F56-E0E07E3B8C3C}"/>
+                </a:ext>
+              </a:extLst>
+            </p:cNvPr>
+            <p:cNvSpPr/>
+            <p:nvPr/>
+          </p:nvSpPr>
+          <p:spPr>
+            <a:xfrm>
+              <a:off x="4337164" y="685451"/>
+              <a:ext cx="365760" cy="365760"/>
+            </a:xfrm>
+            <a:prstGeom prst="ellipse">
+              <a:avLst/>
+            </a:prstGeom>
+            <a:solidFill>
+              <a:srgbClr val="C6C4CD"/>
+            </a:solidFill>
+            <a:ln>
+              <a:solidFill>
+                <a:schemeClr val="accent1">
+                  <a:lumMod val="20000"/>
+                  <a:lumOff val="80000"/>
+                </a:schemeClr>
+              </a:solidFill>
+            </a:ln>
+          </p:spPr>
+          <p:style>
+            <a:lnRef idx="2">
+              <a:schemeClr val="accent1">
+                <a:shade val="50000"/>
+              </a:schemeClr>
+            </a:lnRef>
+            <a:fillRef idx="1">
+              <a:schemeClr val="accent1"/>
+            </a:fillRef>
+            <a:effectRef idx="0">
+              <a:schemeClr val="accent1"/>
+            </a:effectRef>
+            <a:fontRef idx="minor">
+              <a:schemeClr val="lt1"/>
+            </a:fontRef>
+          </p:style>
+          <p:txBody>
+            <a:bodyPr rtlCol="0" anchor="ctr"/>
+            <a:lstStyle/>
+            <a:p>
+              <a:pPr algn="ctr"/>
+              <a:endParaRPr lang="en-US"/>
+            </a:p>
+          </p:txBody>
+        </p:sp>
+        <p:sp>
+          <p:nvSpPr>
+            <p:cNvPr id="10" name="TextBox 9">
+              <a:extLst>
+                <a:ext uri="{FF2B5EF4-FFF2-40B4-BE49-F238E27FC236}">
+                  <a16:creationId xmlns:a16="http://schemas.microsoft.com/office/drawing/2014/main" id="{1A0EB136-5477-4706-9C86-F8AA0F35707D}"/>
+                </a:ext>
+              </a:extLst>
+            </p:cNvPr>
+            <p:cNvSpPr txBox="1"/>
+            <p:nvPr/>
+          </p:nvSpPr>
+          <p:spPr>
+            <a:xfrm>
+              <a:off x="4354586" y="683665"/>
+              <a:ext cx="330916" cy="369332"/>
+            </a:xfrm>
+            <a:prstGeom prst="rect">
+              <a:avLst/>
+            </a:prstGeom>
+            <a:noFill/>
+            <a:ln>
+              <a:noFill/>
+            </a:ln>
+          </p:spPr>
+          <p:txBody>
+            <a:bodyPr wrap="square" rtlCol="0">
+              <a:spAutoFit/>
+            </a:bodyPr>
+            <a:lstStyle/>
+            <a:p>
+              <a:pPr algn="ctr"/>
+              <a:r>
+                <a:rPr lang="fr-BE" dirty="0"/>
+                <a:t>1</a:t>
+              </a:r>
+              <a:endParaRPr lang="en-US" dirty="0"/>
+            </a:p>
+          </p:txBody>
+        </p:sp>
+        <p:pic>
+          <p:nvPicPr>
+            <p:cNvPr id="5" name="Picture 4">
+              <a:extLst>
+                <a:ext uri="{FF2B5EF4-FFF2-40B4-BE49-F238E27FC236}">
+                  <a16:creationId xmlns:a16="http://schemas.microsoft.com/office/drawing/2014/main" id="{001AE326-1697-4AF9-BC81-4E52D194AC0D}"/>
+                </a:ext>
+              </a:extLst>
+            </p:cNvPr>
+            <p:cNvPicPr>
+              <a:picLocks noChangeAspect="1"/>
+            </p:cNvPicPr>
+            <p:nvPr/>
+          </p:nvPicPr>
+          <p:blipFill rotWithShape="1">
+            <a:blip r:embed="rId2"/>
+            <a:srcRect l="6973" t="17349" r="65312" b="6146"/>
+            <a:stretch/>
+          </p:blipFill>
+          <p:spPr>
+            <a:xfrm>
+              <a:off x="0" y="301299"/>
+              <a:ext cx="4222637" cy="6556701"/>
+            </a:xfrm>
+            <a:prstGeom prst="rect">
+              <a:avLst/>
+            </a:prstGeom>
+          </p:spPr>
+        </p:pic>
+        <p:grpSp>
+          <p:nvGrpSpPr>
+            <p:cNvPr id="2" name="Group 1">
+              <a:extLst>
+                <a:ext uri="{FF2B5EF4-FFF2-40B4-BE49-F238E27FC236}">
+                  <a16:creationId xmlns:a16="http://schemas.microsoft.com/office/drawing/2014/main" id="{1CC20B3E-3E12-41A0-A2A9-EFEAE6C87C72}"/>
+                </a:ext>
+              </a:extLst>
+            </p:cNvPr>
+            <p:cNvGrpSpPr/>
+            <p:nvPr/>
+          </p:nvGrpSpPr>
+          <p:grpSpPr>
+            <a:xfrm>
+              <a:off x="4337164" y="2932869"/>
+              <a:ext cx="365760" cy="369332"/>
+              <a:chOff x="4337164" y="2932869"/>
+              <a:chExt cx="365760" cy="369332"/>
+            </a:xfrm>
+          </p:grpSpPr>
+          <p:sp>
+            <p:nvSpPr>
+              <p:cNvPr id="30" name="Oval 29">
+                <a:extLst>
+                  <a:ext uri="{FF2B5EF4-FFF2-40B4-BE49-F238E27FC236}">
+                    <a16:creationId xmlns:a16="http://schemas.microsoft.com/office/drawing/2014/main" id="{1BE794A7-815D-4C5A-AE06-B538ECD44BDF}"/>
+                  </a:ext>
+                </a:extLst>
+              </p:cNvPr>
+              <p:cNvSpPr/>
+              <p:nvPr/>
+            </p:nvSpPr>
+            <p:spPr>
+              <a:xfrm>
+                <a:off x="4337164" y="2934655"/>
+                <a:ext cx="365760" cy="365760"/>
+              </a:xfrm>
+              <a:prstGeom prst="ellipse">
+                <a:avLst/>
+              </a:prstGeom>
+              <a:solidFill>
+                <a:srgbClr val="98CDC6"/>
+              </a:solidFill>
+              <a:ln>
+                <a:solidFill>
+                  <a:schemeClr val="accent1">
+                    <a:lumMod val="20000"/>
+                    <a:lumOff val="80000"/>
+                  </a:schemeClr>
+                </a:solidFill>
+              </a:ln>
+            </p:spPr>
+            <p:style>
+              <a:lnRef idx="2">
+                <a:schemeClr val="accent1">
+                  <a:shade val="50000"/>
+                </a:schemeClr>
+              </a:lnRef>
+              <a:fillRef idx="1">
+                <a:schemeClr val="accent1"/>
+              </a:fillRef>
+              <a:effectRef idx="0">
+                <a:schemeClr val="accent1"/>
+              </a:effectRef>
+              <a:fontRef idx="minor">
+                <a:schemeClr val="lt1"/>
+              </a:fontRef>
+            </p:style>
+            <p:txBody>
+              <a:bodyPr rtlCol="0" anchor="ctr"/>
+              <a:lstStyle/>
+              <a:p>
+                <a:pPr algn="ctr"/>
+                <a:endParaRPr lang="en-US"/>
+              </a:p>
+            </p:txBody>
+          </p:sp>
+          <p:sp>
+            <p:nvSpPr>
+              <p:cNvPr id="31" name="TextBox 30">
+                <a:extLst>
+                  <a:ext uri="{FF2B5EF4-FFF2-40B4-BE49-F238E27FC236}">
+                    <a16:creationId xmlns:a16="http://schemas.microsoft.com/office/drawing/2014/main" id="{EBC37B78-1CC7-4BD0-A6D4-02B44A431731}"/>
+                  </a:ext>
+                </a:extLst>
+              </p:cNvPr>
+              <p:cNvSpPr txBox="1"/>
+              <p:nvPr/>
+            </p:nvSpPr>
+            <p:spPr>
+              <a:xfrm>
+                <a:off x="4354586" y="2932869"/>
+                <a:ext cx="330916" cy="369332"/>
+              </a:xfrm>
+              <a:prstGeom prst="rect">
+                <a:avLst/>
+              </a:prstGeom>
+              <a:noFill/>
+            </p:spPr>
+            <p:txBody>
+              <a:bodyPr wrap="square" rtlCol="0">
+                <a:spAutoFit/>
+              </a:bodyPr>
+              <a:lstStyle/>
+              <a:p>
+                <a:pPr algn="ctr"/>
+                <a:r>
+                  <a:rPr lang="fr-BE" dirty="0"/>
+                  <a:t>3</a:t>
+                </a:r>
+                <a:endParaRPr lang="en-US" dirty="0"/>
+              </a:p>
+            </p:txBody>
+          </p:sp>
+        </p:grpSp>
+        <p:pic>
+          <p:nvPicPr>
+            <p:cNvPr id="47" name="Picture 46">
+              <a:extLst>
+                <a:ext uri="{FF2B5EF4-FFF2-40B4-BE49-F238E27FC236}">
+                  <a16:creationId xmlns:a16="http://schemas.microsoft.com/office/drawing/2014/main" id="{CA02ABF7-38A7-4B92-863F-F7494CD61489}"/>
+                </a:ext>
+              </a:extLst>
+            </p:cNvPr>
+            <p:cNvPicPr>
+              <a:picLocks noChangeAspect="1"/>
+            </p:cNvPicPr>
+            <p:nvPr/>
+          </p:nvPicPr>
+          <p:blipFill rotWithShape="1">
+            <a:blip r:embed="rId2"/>
+            <a:srcRect l="14370" t="66112" r="81175" b="26636"/>
+            <a:stretch/>
+          </p:blipFill>
+          <p:spPr>
+            <a:xfrm>
+              <a:off x="4337164" y="6232963"/>
+              <a:ext cx="365760" cy="334959"/>
+            </a:xfrm>
+            <a:prstGeom prst="rect">
+              <a:avLst/>
+            </a:prstGeom>
+          </p:spPr>
+        </p:pic>
       </p:grpSp>
-      <p:pic>
-        <p:nvPicPr>
-          <p:cNvPr id="47" name="Picture 46">
-            <a:extLst>
-              <a:ext uri="{FF2B5EF4-FFF2-40B4-BE49-F238E27FC236}">
-                <a16:creationId xmlns:a16="http://schemas.microsoft.com/office/drawing/2014/main" id="{CA02ABF7-38A7-4B92-863F-F7494CD61489}"/>
-              </a:ext>
-            </a:extLst>
-          </p:cNvPr>
-          <p:cNvPicPr>
-            <a:picLocks noChangeAspect="1"/>
-          </p:cNvPicPr>
-          <p:nvPr/>
-        </p:nvPicPr>
-        <p:blipFill rotWithShape="1">
-          <a:blip r:embed="rId2"/>
-          <a:srcRect l="14370" t="66112" r="81175" b="26636"/>
-          <a:stretch/>
-        </p:blipFill>
-        <p:spPr>
-          <a:xfrm>
-            <a:off x="4337164" y="6232963"/>
-            <a:ext cx="365760" cy="334959"/>
-          </a:xfrm>
-          <a:prstGeom prst="rect">
-            <a:avLst/>
-          </a:prstGeom>
-        </p:spPr>
-      </p:pic>
     </p:spTree>
     <p:extLst>
       <p:ext uri="{BB962C8B-B14F-4D97-AF65-F5344CB8AC3E}">

</xml_diff>

<commit_message>
Fig1 buffering --> buffer
</commit_message>
<xml_diff>
--- a/manuscripts/diagrams/diagrams_interventions_JV_LDT_JV.pptx
+++ b/manuscripts/diagrams/diagrams_interventions_JV_LDT_JV.pptx
@@ -15405,7 +15405,7 @@
           <p:nvPr>
             <p:extLst>
               <p:ext uri="{D42A27DB-BD31-4B8C-83A1-F6EECF244321}">
-                <p14:modId xmlns:p14="http://schemas.microsoft.com/office/powerpoint/2010/main" val="2297921130"/>
+                <p14:modId xmlns:p14="http://schemas.microsoft.com/office/powerpoint/2010/main" val="266543428"/>
               </p:ext>
             </p:extLst>
           </p:nvPr>
@@ -16150,7 +16150,19 @@
                         <a:rPr lang="en-GB" sz="1400" dirty="0">
                           <a:effectLst/>
                         </a:rPr>
-                        <a:t>Number of contacts people in the safety zone can have with people from the exposed zone (contacts always happen in the buffering zone)</a:t>
+                        <a:t>Number of contacts people in the safety zone can have with people from the exposed zone (contacts always happen in </a:t>
+                      </a:r>
+                      <a:r>
+                        <a:rPr lang="en-GB" sz="1400">
+                          <a:effectLst/>
+                        </a:rPr>
+                        <a:t>the buffer </a:t>
+                      </a:r>
+                      <a:r>
+                        <a:rPr lang="en-GB" sz="1400" dirty="0">
+                          <a:effectLst/>
+                        </a:rPr>
+                        <a:t>zone)</a:t>
                       </a:r>
                       <a:endParaRPr lang="en-GB" sz="1400" dirty="0">
                         <a:effectLst/>

</xml_diff>